<commit_message>
Note the Java Collection in ppt
</commit_message>
<xml_diff>
--- a/JavaStudy/JavaStudyNote/Java_Collection.pptx
+++ b/JavaStudy/JavaStudyNote/Java_Collection.pptx
@@ -12,6 +12,7 @@
     <p:sldId id="260" r:id="rId6"/>
     <p:sldId id="261" r:id="rId7"/>
     <p:sldId id="262" r:id="rId8"/>
+    <p:sldId id="263" r:id="rId9"/>
   </p:sldIdLst>
   <p:sldSz cx="12192000" cy="6858000"/>
   <p:notesSz cx="6858000" cy="9144000"/>
@@ -122,6 +123,7 @@
             <p14:sldId id="260"/>
             <p14:sldId id="261"/>
             <p14:sldId id="262"/>
+            <p14:sldId id="263"/>
           </p14:sldIdLst>
         </p14:section>
       </p14:sectionLst>
@@ -280,7 +282,7 @@
           <a:p>
             <a:fld id="{F0D5F047-5AAE-44AB-BB5D-D928A070281F}" type="datetimeFigureOut">
               <a:rPr lang="zh-TW" altLang="en-US" smtClean="0"/>
-              <a:t>2023/1/26</a:t>
+              <a:t>2023/1/27</a:t>
             </a:fld>
             <a:endParaRPr lang="zh-TW" altLang="en-US"/>
           </a:p>
@@ -478,7 +480,7 @@
           <a:p>
             <a:fld id="{F0D5F047-5AAE-44AB-BB5D-D928A070281F}" type="datetimeFigureOut">
               <a:rPr lang="zh-TW" altLang="en-US" smtClean="0"/>
-              <a:t>2023/1/26</a:t>
+              <a:t>2023/1/27</a:t>
             </a:fld>
             <a:endParaRPr lang="zh-TW" altLang="en-US"/>
           </a:p>
@@ -686,7 +688,7 @@
           <a:p>
             <a:fld id="{F0D5F047-5AAE-44AB-BB5D-D928A070281F}" type="datetimeFigureOut">
               <a:rPr lang="zh-TW" altLang="en-US" smtClean="0"/>
-              <a:t>2023/1/26</a:t>
+              <a:t>2023/1/27</a:t>
             </a:fld>
             <a:endParaRPr lang="zh-TW" altLang="en-US"/>
           </a:p>
@@ -884,7 +886,7 @@
           <a:p>
             <a:fld id="{F0D5F047-5AAE-44AB-BB5D-D928A070281F}" type="datetimeFigureOut">
               <a:rPr lang="zh-TW" altLang="en-US" smtClean="0"/>
-              <a:t>2023/1/26</a:t>
+              <a:t>2023/1/27</a:t>
             </a:fld>
             <a:endParaRPr lang="zh-TW" altLang="en-US"/>
           </a:p>
@@ -1159,7 +1161,7 @@
           <a:p>
             <a:fld id="{F0D5F047-5AAE-44AB-BB5D-D928A070281F}" type="datetimeFigureOut">
               <a:rPr lang="zh-TW" altLang="en-US" smtClean="0"/>
-              <a:t>2023/1/26</a:t>
+              <a:t>2023/1/27</a:t>
             </a:fld>
             <a:endParaRPr lang="zh-TW" altLang="en-US"/>
           </a:p>
@@ -1424,7 +1426,7 @@
           <a:p>
             <a:fld id="{F0D5F047-5AAE-44AB-BB5D-D928A070281F}" type="datetimeFigureOut">
               <a:rPr lang="zh-TW" altLang="en-US" smtClean="0"/>
-              <a:t>2023/1/26</a:t>
+              <a:t>2023/1/27</a:t>
             </a:fld>
             <a:endParaRPr lang="zh-TW" altLang="en-US"/>
           </a:p>
@@ -1836,7 +1838,7 @@
           <a:p>
             <a:fld id="{F0D5F047-5AAE-44AB-BB5D-D928A070281F}" type="datetimeFigureOut">
               <a:rPr lang="zh-TW" altLang="en-US" smtClean="0"/>
-              <a:t>2023/1/26</a:t>
+              <a:t>2023/1/27</a:t>
             </a:fld>
             <a:endParaRPr lang="zh-TW" altLang="en-US"/>
           </a:p>
@@ -1977,7 +1979,7 @@
           <a:p>
             <a:fld id="{F0D5F047-5AAE-44AB-BB5D-D928A070281F}" type="datetimeFigureOut">
               <a:rPr lang="zh-TW" altLang="en-US" smtClean="0"/>
-              <a:t>2023/1/26</a:t>
+              <a:t>2023/1/27</a:t>
             </a:fld>
             <a:endParaRPr lang="zh-TW" altLang="en-US"/>
           </a:p>
@@ -2090,7 +2092,7 @@
           <a:p>
             <a:fld id="{F0D5F047-5AAE-44AB-BB5D-D928A070281F}" type="datetimeFigureOut">
               <a:rPr lang="zh-TW" altLang="en-US" smtClean="0"/>
-              <a:t>2023/1/26</a:t>
+              <a:t>2023/1/27</a:t>
             </a:fld>
             <a:endParaRPr lang="zh-TW" altLang="en-US"/>
           </a:p>
@@ -2401,7 +2403,7 @@
           <a:p>
             <a:fld id="{F0D5F047-5AAE-44AB-BB5D-D928A070281F}" type="datetimeFigureOut">
               <a:rPr lang="zh-TW" altLang="en-US" smtClean="0"/>
-              <a:t>2023/1/26</a:t>
+              <a:t>2023/1/27</a:t>
             </a:fld>
             <a:endParaRPr lang="zh-TW" altLang="en-US"/>
           </a:p>
@@ -2689,7 +2691,7 @@
           <a:p>
             <a:fld id="{F0D5F047-5AAE-44AB-BB5D-D928A070281F}" type="datetimeFigureOut">
               <a:rPr lang="zh-TW" altLang="en-US" smtClean="0"/>
-              <a:t>2023/1/26</a:t>
+              <a:t>2023/1/27</a:t>
             </a:fld>
             <a:endParaRPr lang="zh-TW" altLang="en-US"/>
           </a:p>
@@ -2930,7 +2932,7 @@
           <a:p>
             <a:fld id="{F0D5F047-5AAE-44AB-BB5D-D928A070281F}" type="datetimeFigureOut">
               <a:rPr lang="zh-TW" altLang="en-US" smtClean="0"/>
-              <a:t>2023/1/26</a:t>
+              <a:t>2023/1/27</a:t>
             </a:fld>
             <a:endParaRPr lang="zh-TW" altLang="en-US"/>
           </a:p>
@@ -3596,7 +3598,7 @@
             </a:r>
             <a:r>
               <a:rPr lang="zh-CN" altLang="en-US" dirty="0"/>
-              <a:t>無需不可重複</a:t>
+              <a:t>無續不可重複</a:t>
             </a:r>
             <a:endParaRPr lang="en-US" altLang="zh-CN" dirty="0"/>
           </a:p>
@@ -4176,6 +4178,20 @@
               <a:t>	</a:t>
             </a:r>
             <a:r>
+              <a:rPr lang="en-US" altLang="zh-CN" dirty="0" err="1"/>
+              <a:t>Iterable</a:t>
+            </a:r>
+            <a:r>
+              <a:rPr lang="en-US" altLang="zh-CN" dirty="0"/>
+              <a:t> </a:t>
+            </a:r>
+            <a:r>
+              <a:rPr lang="en-US" altLang="zh-CN" dirty="0">
+                <a:sym typeface="Wingdings" panose="05000000000000000000" pitchFamily="2" charset="2"/>
+              </a:rPr>
+              <a:t> </a:t>
+            </a:r>
+            <a:r>
               <a:rPr lang="en-US" altLang="zh-CN" dirty="0"/>
               <a:t>foreach(Consumer&lt;? Super T&gt; action)    (java1.8</a:t>
             </a:r>
@@ -4191,7 +4207,13 @@
           <a:p>
             <a:r>
               <a:rPr lang="en-US" altLang="zh-TW" dirty="0"/>
-              <a:t>	</a:t>
+              <a:t>	Iterator  </a:t>
+            </a:r>
+            <a:r>
+              <a:rPr lang="en-US" altLang="zh-TW" dirty="0">
+                <a:sym typeface="Wingdings" panose="05000000000000000000" pitchFamily="2" charset="2"/>
+              </a:rPr>
+              <a:t> </a:t>
             </a:r>
             <a:r>
               <a:rPr lang="en-US" altLang="zh-TW" dirty="0" err="1"/>
@@ -4253,51 +4275,152 @@
       </p:grpSpPr>
       <p:sp>
         <p:nvSpPr>
-          <p:cNvPr id="2" name="標題 1">
-            <a:extLst>
-              <a:ext uri="{FF2B5EF4-FFF2-40B4-BE49-F238E27FC236}">
-                <a16:creationId xmlns:a16="http://schemas.microsoft.com/office/drawing/2014/main" id="{0BE7986B-65F2-4D3B-9B25-B26541F522B3}"/>
-              </a:ext>
-            </a:extLst>
-          </p:cNvPr>
-          <p:cNvSpPr>
-            <a:spLocks noGrp="1"/>
-          </p:cNvSpPr>
-          <p:nvPr>
-            <p:ph type="title"/>
-          </p:nvPr>
-        </p:nvSpPr>
-        <p:spPr/>
-        <p:txBody>
-          <a:bodyPr/>
-          <a:lstStyle/>
-          <a:p>
-            <a:endParaRPr lang="zh-TW" altLang="en-US"/>
-          </a:p>
-        </p:txBody>
-      </p:sp>
-      <p:sp>
-        <p:nvSpPr>
-          <p:cNvPr id="3" name="內容版面配置區 2">
-            <a:extLst>
-              <a:ext uri="{FF2B5EF4-FFF2-40B4-BE49-F238E27FC236}">
-                <a16:creationId xmlns:a16="http://schemas.microsoft.com/office/drawing/2014/main" id="{7022D026-2C83-48F1-80F4-29FD1233C505}"/>
-              </a:ext>
-            </a:extLst>
-          </p:cNvPr>
-          <p:cNvSpPr>
-            <a:spLocks noGrp="1"/>
-          </p:cNvSpPr>
-          <p:nvPr>
-            <p:ph idx="1"/>
-          </p:nvPr>
-        </p:nvSpPr>
-        <p:spPr/>
-        <p:txBody>
-          <a:bodyPr/>
-          <a:lstStyle/>
-          <a:p>
-            <a:endParaRPr lang="zh-TW" altLang="en-US"/>
+          <p:cNvPr id="4" name="文字方塊 3">
+            <a:extLst>
+              <a:ext uri="{FF2B5EF4-FFF2-40B4-BE49-F238E27FC236}">
+                <a16:creationId xmlns:a16="http://schemas.microsoft.com/office/drawing/2014/main" id="{E1995265-C712-4B4A-8847-00B195AA1078}"/>
+              </a:ext>
+            </a:extLst>
+          </p:cNvPr>
+          <p:cNvSpPr txBox="1"/>
+          <p:nvPr/>
+        </p:nvSpPr>
+        <p:spPr>
+          <a:xfrm>
+            <a:off x="304800" y="294640"/>
+            <a:ext cx="10021911" cy="2246769"/>
+          </a:xfrm>
+          <a:prstGeom prst="rect">
+            <a:avLst/>
+          </a:prstGeom>
+          <a:noFill/>
+        </p:spPr>
+        <p:txBody>
+          <a:bodyPr wrap="none" rtlCol="0">
+            <a:spAutoFit/>
+          </a:bodyPr>
+          <a:lstStyle/>
+          <a:p>
+            <a:r>
+              <a:rPr lang="zh-CN" altLang="en-US" sz="2000" b="1" u="sng" dirty="0"/>
+              <a:t>函數式接口方法</a:t>
+            </a:r>
+            <a:endParaRPr lang="en-US" altLang="zh-CN" sz="2000" b="1" u="sng" dirty="0"/>
+          </a:p>
+          <a:p>
+            <a:endParaRPr lang="en-US" altLang="zh-TW" sz="2000" b="1" u="sng" dirty="0"/>
+          </a:p>
+          <a:p>
+            <a:r>
+              <a:rPr lang="en-US" altLang="zh-CN" sz="2000" b="1" dirty="0"/>
+              <a:t>	1.  Predicate (</a:t>
+            </a:r>
+            <a:r>
+              <a:rPr lang="en-US" altLang="zh-CN" sz="2000" b="1" dirty="0" err="1"/>
+              <a:t>java.util.function</a:t>
+            </a:r>
+            <a:r>
+              <a:rPr lang="en-US" altLang="zh-CN" sz="2000" b="1" dirty="0"/>
+              <a:t>)</a:t>
+            </a:r>
+          </a:p>
+          <a:p>
+            <a:r>
+              <a:rPr lang="en-US" altLang="zh-TW" sz="2000" b="1" dirty="0"/>
+              <a:t>		</a:t>
+            </a:r>
+            <a:r>
+              <a:rPr lang="zh-CN" altLang="en-US" sz="2000" b="1" dirty="0"/>
+              <a:t>方法 </a:t>
+            </a:r>
+            <a:r>
+              <a:rPr lang="en-US" altLang="zh-TW" sz="2000" b="1" dirty="0" err="1"/>
+              <a:t>boolean</a:t>
+            </a:r>
+            <a:r>
+              <a:rPr lang="en-US" altLang="zh-TW" sz="2000" b="1" dirty="0"/>
+              <a:t> test(T t)  </a:t>
+            </a:r>
+            <a:r>
+              <a:rPr lang="zh-CN" altLang="en-US" sz="2000" b="1" dirty="0"/>
+              <a:t>傳入</a:t>
+            </a:r>
+            <a:r>
+              <a:rPr lang="en-US" altLang="zh-CN" sz="2000" b="1" dirty="0"/>
+              <a:t>lambda</a:t>
+            </a:r>
+            <a:r>
+              <a:rPr lang="zh-CN" altLang="en-US" sz="2000" b="1" dirty="0"/>
+              <a:t>表達式條件</a:t>
+            </a:r>
+            <a:r>
+              <a:rPr lang="en-US" altLang="zh-CN" sz="2000" b="1" dirty="0"/>
+              <a:t>(str -&gt; </a:t>
+            </a:r>
+            <a:r>
+              <a:rPr lang="en-US" altLang="zh-CN" sz="2000" b="1" dirty="0" err="1"/>
+              <a:t>str.contains</a:t>
+            </a:r>
+            <a:r>
+              <a:rPr lang="en-US" altLang="zh-CN" sz="2000" b="1" dirty="0"/>
+              <a:t>(“1”))</a:t>
+            </a:r>
+          </a:p>
+          <a:p>
+            <a:endParaRPr lang="en-US" altLang="zh-TW" sz="2000" b="1" dirty="0"/>
+          </a:p>
+          <a:p>
+            <a:r>
+              <a:rPr lang="en-US" altLang="zh-TW" sz="2000" b="1" dirty="0"/>
+              <a:t>	2. Consumer(</a:t>
+            </a:r>
+            <a:r>
+              <a:rPr lang="en-US" altLang="zh-TW" sz="2000" b="1" dirty="0" err="1"/>
+              <a:t>java.util.function</a:t>
+            </a:r>
+            <a:r>
+              <a:rPr lang="en-US" altLang="zh-TW" sz="2000" b="1" dirty="0"/>
+              <a:t>)</a:t>
+            </a:r>
+          </a:p>
+          <a:p>
+            <a:r>
+              <a:rPr lang="en-US" altLang="zh-TW" sz="2000" b="1" dirty="0"/>
+              <a:t>		</a:t>
+            </a:r>
+            <a:r>
+              <a:rPr lang="zh-CN" altLang="en-US" sz="2000" b="1" dirty="0"/>
+              <a:t>方法 </a:t>
+            </a:r>
+            <a:r>
+              <a:rPr lang="en-US" altLang="zh-CN" sz="2000" b="1" dirty="0"/>
+              <a:t>void accept(T t)  </a:t>
+            </a:r>
+            <a:r>
+              <a:rPr lang="zh-CN" altLang="en-US" sz="2000" b="1" dirty="0"/>
+              <a:t>傳入</a:t>
+            </a:r>
+            <a:r>
+              <a:rPr lang="en-US" altLang="zh-CN" sz="2000" b="1" dirty="0"/>
+              <a:t>lambda</a:t>
+            </a:r>
+            <a:r>
+              <a:rPr lang="zh-CN" altLang="en-US" sz="2000" b="1" dirty="0"/>
+              <a:t>表達式條件</a:t>
+            </a:r>
+            <a:r>
+              <a:rPr lang="en-US" altLang="zh-CN" sz="2000" b="1" dirty="0"/>
+              <a:t>(str-&gt;</a:t>
+            </a:r>
+            <a:r>
+              <a:rPr lang="en-US" altLang="zh-CN" sz="2000" b="1" dirty="0" err="1"/>
+              <a:t>System.out.println</a:t>
+            </a:r>
+            <a:r>
+              <a:rPr lang="en-US" altLang="zh-CN" sz="2000" b="1" dirty="0"/>
+              <a:t>(str))</a:t>
+            </a:r>
+            <a:endParaRPr lang="zh-TW" altLang="en-US" sz="2000" b="1" dirty="0"/>
           </a:p>
         </p:txBody>
       </p:sp>
@@ -4305,6 +4428,275 @@
     <p:extLst>
       <p:ext uri="{BB962C8B-B14F-4D97-AF65-F5344CB8AC3E}">
         <p14:creationId xmlns:p14="http://schemas.microsoft.com/office/powerpoint/2010/main" val="1140554678"/>
+      </p:ext>
+    </p:extLst>
+  </p:cSld>
+  <p:clrMapOvr>
+    <a:masterClrMapping/>
+  </p:clrMapOvr>
+</p:sld>
+</file>
+
+<file path=ppt/slides/slide8.xml><?xml version="1.0" encoding="utf-8"?>
+<p:sld xmlns:a="http://schemas.openxmlformats.org/drawingml/2006/main" xmlns:r="http://schemas.openxmlformats.org/officeDocument/2006/relationships" xmlns:p="http://schemas.openxmlformats.org/presentationml/2006/main">
+  <p:cSld>
+    <p:spTree>
+      <p:nvGrpSpPr>
+        <p:cNvPr id="1" name=""/>
+        <p:cNvGrpSpPr/>
+        <p:nvPr/>
+      </p:nvGrpSpPr>
+      <p:grpSpPr>
+        <a:xfrm>
+          <a:off x="0" y="0"/>
+          <a:ext cx="0" cy="0"/>
+          <a:chOff x="0" y="0"/>
+          <a:chExt cx="0" cy="0"/>
+        </a:xfrm>
+      </p:grpSpPr>
+      <p:sp>
+        <p:nvSpPr>
+          <p:cNvPr id="5" name="文字方塊 4">
+            <a:extLst>
+              <a:ext uri="{FF2B5EF4-FFF2-40B4-BE49-F238E27FC236}">
+                <a16:creationId xmlns:a16="http://schemas.microsoft.com/office/drawing/2014/main" id="{7E757475-0B8D-4AA9-A429-3F8F827D3576}"/>
+              </a:ext>
+            </a:extLst>
+          </p:cNvPr>
+          <p:cNvSpPr txBox="1"/>
+          <p:nvPr/>
+        </p:nvSpPr>
+        <p:spPr>
+          <a:xfrm>
+            <a:off x="243840" y="172720"/>
+            <a:ext cx="7853680" cy="461665"/>
+          </a:xfrm>
+          <a:prstGeom prst="rect">
+            <a:avLst/>
+          </a:prstGeom>
+          <a:noFill/>
+        </p:spPr>
+        <p:txBody>
+          <a:bodyPr wrap="square" rtlCol="0">
+            <a:spAutoFit/>
+          </a:bodyPr>
+          <a:lstStyle/>
+          <a:p>
+            <a:r>
+              <a:rPr lang="en-US" altLang="zh-CN" sz="2400" b="1" u="sng" dirty="0"/>
+              <a:t>Stream</a:t>
+            </a:r>
+            <a:r>
+              <a:rPr lang="zh-CN" altLang="en-US" sz="2400" b="1" u="sng" dirty="0"/>
+              <a:t>的使用</a:t>
+            </a:r>
+            <a:r>
+              <a:rPr lang="en-US" altLang="zh-CN" sz="2400" b="1" u="sng" dirty="0"/>
+              <a:t>(Java1.8)</a:t>
+            </a:r>
+            <a:endParaRPr lang="zh-TW" altLang="en-US" sz="2400" b="1" u="sng" dirty="0"/>
+          </a:p>
+        </p:txBody>
+      </p:sp>
+      <p:sp>
+        <p:nvSpPr>
+          <p:cNvPr id="6" name="文字方塊 5">
+            <a:extLst>
+              <a:ext uri="{FF2B5EF4-FFF2-40B4-BE49-F238E27FC236}">
+                <a16:creationId xmlns:a16="http://schemas.microsoft.com/office/drawing/2014/main" id="{80BFBF39-4784-4F4B-9921-459EAC1744A7}"/>
+              </a:ext>
+            </a:extLst>
+          </p:cNvPr>
+          <p:cNvSpPr txBox="1"/>
+          <p:nvPr/>
+        </p:nvSpPr>
+        <p:spPr>
+          <a:xfrm>
+            <a:off x="457200" y="741680"/>
+            <a:ext cx="11267440" cy="3970318"/>
+          </a:xfrm>
+          <a:prstGeom prst="rect">
+            <a:avLst/>
+          </a:prstGeom>
+          <a:noFill/>
+        </p:spPr>
+        <p:txBody>
+          <a:bodyPr wrap="square" rtlCol="0">
+            <a:spAutoFit/>
+          </a:bodyPr>
+          <a:lstStyle/>
+          <a:p>
+            <a:pPr marL="342900" indent="-342900">
+              <a:buAutoNum type="arabicPeriod"/>
+            </a:pPr>
+            <a:r>
+              <a:rPr lang="en-US" altLang="zh-TW" b="1" dirty="0" err="1"/>
+              <a:t>IntStream</a:t>
+            </a:r>
+            <a:r>
+              <a:rPr lang="zh-CN" altLang="en-US" b="1" dirty="0"/>
+              <a:t>的代碼實例</a:t>
+            </a:r>
+            <a:endParaRPr lang="en-US" altLang="zh-CN" b="1" dirty="0"/>
+          </a:p>
+          <a:p>
+            <a:r>
+              <a:rPr lang="en-US" altLang="zh-TW" b="1" dirty="0"/>
+              <a:t>	</a:t>
+            </a:r>
+            <a:r>
+              <a:rPr lang="en-US" altLang="zh-CN" b="1" dirty="0" err="1"/>
+              <a:t>IntStream</a:t>
+            </a:r>
+            <a:r>
+              <a:rPr lang="en-US" altLang="zh-CN" b="1" dirty="0"/>
+              <a:t> is = </a:t>
+            </a:r>
+            <a:r>
+              <a:rPr lang="en-US" altLang="zh-CN" b="1" dirty="0" err="1"/>
+              <a:t>IntStream.builder</a:t>
+            </a:r>
+            <a:r>
+              <a:rPr lang="en-US" altLang="zh-CN" b="1" dirty="0"/>
+              <a:t>()</a:t>
+            </a:r>
+          </a:p>
+          <a:p>
+            <a:r>
+              <a:rPr lang="en-US" altLang="zh-TW" b="1" dirty="0"/>
+              <a:t>		.add(6)</a:t>
+            </a:r>
+          </a:p>
+          <a:p>
+            <a:r>
+              <a:rPr lang="en-US" altLang="zh-TW" b="1" dirty="0"/>
+              <a:t>		.add(5)</a:t>
+            </a:r>
+          </a:p>
+          <a:p>
+            <a:r>
+              <a:rPr lang="en-US" altLang="zh-TW" b="1" dirty="0"/>
+              <a:t>		.add(7)</a:t>
+            </a:r>
+          </a:p>
+          <a:p>
+            <a:r>
+              <a:rPr lang="en-US" altLang="zh-TW" b="1" dirty="0"/>
+              <a:t>		.add(4)</a:t>
+            </a:r>
+          </a:p>
+          <a:p>
+            <a:r>
+              <a:rPr lang="en-US" altLang="zh-TW" b="1" dirty="0"/>
+              <a:t>		.add(8)</a:t>
+            </a:r>
+          </a:p>
+          <a:p>
+            <a:r>
+              <a:rPr lang="en-US" altLang="zh-TW" b="1" dirty="0"/>
+              <a:t>		.build();</a:t>
+            </a:r>
+          </a:p>
+          <a:p>
+            <a:endParaRPr lang="en-US" altLang="zh-TW" b="1" dirty="0"/>
+          </a:p>
+          <a:p>
+            <a:r>
+              <a:rPr lang="en-US" altLang="zh-CN" b="1" dirty="0"/>
+              <a:t>2.   </a:t>
+            </a:r>
+            <a:r>
+              <a:rPr lang="en-US" altLang="zh-CN" b="1" dirty="0" err="1"/>
+              <a:t>IntStream</a:t>
+            </a:r>
+            <a:r>
+              <a:rPr lang="zh-CN" altLang="en-US" b="1" dirty="0"/>
+              <a:t>類的方法歸類</a:t>
+            </a:r>
+            <a:endParaRPr lang="en-US" altLang="zh-CN" b="1" dirty="0"/>
+          </a:p>
+          <a:p>
+            <a:r>
+              <a:rPr lang="en-US" altLang="zh-CN" b="1" dirty="0"/>
+              <a:t>	</a:t>
+            </a:r>
+            <a:r>
+              <a:rPr lang="zh-CN" altLang="en-US" b="1" dirty="0"/>
+              <a:t>中间方法：</a:t>
+            </a:r>
+            <a:r>
+              <a:rPr lang="zh-CN" altLang="en-US" dirty="0"/>
+              <a:t>中间操作允许流保持打开状态，并允许直接调用后续方法。上面程序中的</a:t>
+            </a:r>
+            <a:r>
+              <a:rPr lang="en-US" altLang="zh-CN" dirty="0"/>
+              <a:t>map()</a:t>
+            </a:r>
+            <a:r>
+              <a:rPr lang="zh-CN" altLang="en-US" dirty="0"/>
+              <a:t>方法就是中   </a:t>
+            </a:r>
+            <a:endParaRPr lang="en-US" altLang="zh-CN" dirty="0"/>
+          </a:p>
+          <a:p>
+            <a:r>
+              <a:rPr lang="en-US" altLang="zh-CN" dirty="0"/>
+              <a:t>                                        </a:t>
+            </a:r>
+            <a:r>
+              <a:rPr lang="zh-CN" altLang="en-US" dirty="0"/>
+              <a:t>间方法。</a:t>
+            </a:r>
+            <a:r>
+              <a:rPr lang="zh-CN" altLang="en-US" b="1" dirty="0"/>
+              <a:t>中间方法的返回值是另外一个流。</a:t>
+            </a:r>
+            <a:endParaRPr lang="en-US" altLang="zh-CN" b="1" dirty="0"/>
+          </a:p>
+          <a:p>
+            <a:r>
+              <a:rPr lang="zh-CN" altLang="en-US" b="1" dirty="0"/>
+              <a:t>                  末端方法：</a:t>
+            </a:r>
+            <a:r>
+              <a:rPr lang="zh-CN" altLang="en-US" dirty="0"/>
+              <a:t>末端方法是对流的最终操作。当对某个</a:t>
+            </a:r>
+            <a:r>
+              <a:rPr lang="en-US" altLang="zh-CN" dirty="0"/>
+              <a:t>Stream</a:t>
+            </a:r>
+            <a:r>
+              <a:rPr lang="zh-CN" altLang="en-US" dirty="0"/>
+              <a:t>执行末端方法后，该流将会被“消耗”且不再</a:t>
+            </a:r>
+            <a:endParaRPr lang="en-US" altLang="zh-CN" dirty="0"/>
+          </a:p>
+          <a:p>
+            <a:r>
+              <a:rPr lang="en-US" altLang="zh-CN" dirty="0"/>
+              <a:t>                                        </a:t>
+            </a:r>
+            <a:r>
+              <a:rPr lang="zh-CN" altLang="en-US" dirty="0"/>
+              <a:t>可用。執行完末端方法</a:t>
+            </a:r>
+            <a:r>
+              <a:rPr lang="en-US" altLang="zh-CN" dirty="0" err="1"/>
+              <a:t>IntStream</a:t>
+            </a:r>
+            <a:r>
+              <a:rPr lang="zh-CN" altLang="en-US" dirty="0"/>
+              <a:t>將不能被再次操作</a:t>
+            </a:r>
+            <a:endParaRPr lang="zh-TW" altLang="en-US" b="1" dirty="0"/>
+          </a:p>
+        </p:txBody>
+      </p:sp>
+    </p:spTree>
+    <p:extLst>
+      <p:ext uri="{BB962C8B-B14F-4D97-AF65-F5344CB8AC3E}">
+        <p14:creationId xmlns:p14="http://schemas.microsoft.com/office/powerpoint/2010/main" val="1359501113"/>
       </p:ext>
     </p:extLst>
   </p:cSld>

</xml_diff>